<commit_message>
merged figure 1 caption edits, added some more specific directions.
</commit_message>
<xml_diff>
--- a/Configurations/pinpairformal5.pptx
+++ b/Configurations/pinpairformal5.pptx
@@ -5349,8 +5349,8 @@
           </p:nvSpPr>
           <p:spPr>
             <a:xfrm>
-              <a:off x="1806602" y="4852239"/>
-              <a:ext cx="1787703" cy="323165"/>
+              <a:off x="1425902" y="4852239"/>
+              <a:ext cx="2168404" cy="323165"/>
             </a:xfrm>
             <a:prstGeom prst="rect">
               <a:avLst/>
@@ -5364,8 +5364,12 @@
             <a:lstStyle/>
             <a:p>
               <a:r>
+                <a:rPr lang="en-US" sz="1500" smtClean="0"/>
+                <a:t>Decelerator Axis (mm</a:t>
+              </a:r>
+              <a:r>
                 <a:rPr lang="en-US" sz="1500" dirty="0"/>
-                <a:t>Distance (mm)</a:t>
+                <a:t>)</a:t>
               </a:r>
             </a:p>
           </p:txBody>
@@ -7065,8 +7069,8 @@
             </p:nvSpPr>
             <p:spPr>
               <a:xfrm>
-                <a:off x="5593070" y="4848875"/>
-                <a:ext cx="1787703" cy="323165"/>
+                <a:off x="5210742" y="4848875"/>
+                <a:ext cx="2170032" cy="323165"/>
               </a:xfrm>
               <a:prstGeom prst="rect">
                 <a:avLst/>
@@ -7080,8 +7084,12 @@
               <a:lstStyle/>
               <a:p>
                 <a:r>
+                  <a:rPr lang="en-US" sz="1500" smtClean="0"/>
+                  <a:t>Decelerator Axis (mm</a:t>
+                </a:r>
+                <a:r>
                   <a:rPr lang="en-US" sz="1500" dirty="0"/>
-                  <a:t>Distance (mm)</a:t>
+                  <a:t>)</a:t>
                 </a:r>
               </a:p>
             </p:txBody>
@@ -8592,8 +8600,8 @@
         </p:nvSpPr>
         <p:spPr>
           <a:xfrm rot="16200000">
-            <a:off x="-737087" y="1820054"/>
-            <a:ext cx="1787703" cy="323165"/>
+            <a:off x="-1209438" y="975171"/>
+            <a:ext cx="2800137" cy="323165"/>
           </a:xfrm>
           <a:prstGeom prst="rect">
             <a:avLst/>
@@ -8607,37 +8615,12 @@
           <a:lstStyle/>
           <a:p>
             <a:r>
-              <a:rPr lang="en-US" sz="1500" dirty="0"/>
-              <a:t>Distance (mm)</a:t>
+              <a:rPr lang="en-US" sz="1500" smtClean="0"/>
+              <a:t>Distance from Axis (mm</a:t>
             </a:r>
-          </a:p>
-        </p:txBody>
-      </p:sp>
-      <p:sp>
-        <p:nvSpPr>
-          <p:cNvPr id="482" name="TextBox 481"/>
-          <p:cNvSpPr txBox="1"/>
-          <p:nvPr/>
-        </p:nvSpPr>
-        <p:spPr>
-          <a:xfrm rot="16200000">
-            <a:off x="-724739" y="318658"/>
-            <a:ext cx="1787703" cy="323165"/>
-          </a:xfrm>
-          <a:prstGeom prst="rect">
-            <a:avLst/>
-          </a:prstGeom>
-          <a:noFill/>
-        </p:spPr>
-        <p:txBody>
-          <a:bodyPr wrap="square" rtlCol="0">
-            <a:spAutoFit/>
-          </a:bodyPr>
-          <a:lstStyle/>
-          <a:p>
             <a:r>
               <a:rPr lang="en-US" sz="1500" dirty="0"/>
-              <a:t>Distance (mm)</a:t>
+              <a:t>)</a:t>
             </a:r>
           </a:p>
         </p:txBody>
@@ -10545,8 +10528,8 @@
               </p:nvSpPr>
               <p:spPr>
                 <a:xfrm>
-                  <a:off x="9322253" y="3976215"/>
-                  <a:ext cx="1345284" cy="323165"/>
+                  <a:off x="9033296" y="3976215"/>
+                  <a:ext cx="2070591" cy="323165"/>
                 </a:xfrm>
                 <a:prstGeom prst="rect">
                   <a:avLst/>
@@ -10560,12 +10543,12 @@
                 <a:lstStyle/>
                 <a:p>
                   <a:r>
-                    <a:rPr lang="en-US" sz="1500"/>
-                    <a:t>Distance </a:t>
+                    <a:rPr lang="en-US" sz="1500" dirty="0" smtClean="0"/>
+                    <a:t>Decelerator Axis (mm</a:t>
                   </a:r>
                   <a:r>
                     <a:rPr lang="en-US" sz="1500" dirty="0"/>
-                    <a:t>(mm)</a:t>
+                    <a:t>)</a:t>
                   </a:r>
                 </a:p>
               </p:txBody>

</xml_diff>

<commit_message>
Parent ppt for those edits
</commit_message>
<xml_diff>
--- a/Configurations/pinpairformal5.pptx
+++ b/Configurations/pinpairformal5.pptx
@@ -3362,6 +3362,35 @@
       </p:grpSpPr>
       <p:pic>
         <p:nvPicPr>
+          <p:cNvPr id="252" name="Picture 251"/>
+          <p:cNvPicPr>
+            <a:picLocks noChangeAspect="1"/>
+          </p:cNvPicPr>
+          <p:nvPr/>
+        </p:nvPicPr>
+        <p:blipFill rotWithShape="1">
+          <a:blip r:embed="rId3" cstate="print">
+            <a:extLst>
+              <a:ext uri="{28A0092B-C50C-407E-A947-70E740481C1C}">
+                <a14:useLocalDpi xmlns:a14="http://schemas.microsoft.com/office/drawing/2010/main" val="0"/>
+              </a:ext>
+            </a:extLst>
+          </a:blip>
+          <a:srcRect l="5407" t="34263" r="48004" b="40316"/>
+          <a:stretch/>
+        </p:blipFill>
+        <p:spPr>
+          <a:xfrm>
+            <a:off x="473286" y="3161401"/>
+            <a:ext cx="3787256" cy="813555"/>
+          </a:xfrm>
+          <a:prstGeom prst="rect">
+            <a:avLst/>
+          </a:prstGeom>
+        </p:spPr>
+      </p:pic>
+      <p:pic>
+        <p:nvPicPr>
           <p:cNvPr id="717" name="Picture 716"/>
           <p:cNvPicPr>
             <a:picLocks noChangeAspect="1"/>
@@ -4878,35 +4907,6 @@
           </a:p>
         </p:txBody>
       </p:sp>
-      <p:pic>
-        <p:nvPicPr>
-          <p:cNvPr id="252" name="Picture 251"/>
-          <p:cNvPicPr>
-            <a:picLocks noChangeAspect="1"/>
-          </p:cNvPicPr>
-          <p:nvPr/>
-        </p:nvPicPr>
-        <p:blipFill rotWithShape="1">
-          <a:blip r:embed="rId3" cstate="print">
-            <a:extLst>
-              <a:ext uri="{28A0092B-C50C-407E-A947-70E740481C1C}">
-                <a14:useLocalDpi xmlns:a14="http://schemas.microsoft.com/office/drawing/2010/main" val="0"/>
-              </a:ext>
-            </a:extLst>
-          </a:blip>
-          <a:srcRect l="5407" t="34263" r="48004" b="40316"/>
-          <a:stretch/>
-        </p:blipFill>
-        <p:spPr>
-          <a:xfrm>
-            <a:off x="473286" y="3161401"/>
-            <a:ext cx="3787256" cy="813555"/>
-          </a:xfrm>
-          <a:prstGeom prst="rect">
-            <a:avLst/>
-          </a:prstGeom>
-        </p:spPr>
-      </p:pic>
       <p:sp>
         <p:nvSpPr>
           <p:cNvPr id="253" name="TextBox 252"/>
@@ -7084,7 +7084,7 @@
               <a:lstStyle/>
               <a:p>
                 <a:r>
-                  <a:rPr lang="en-US" sz="1500" smtClean="0"/>
+                  <a:rPr lang="en-US" sz="1500" dirty="0" smtClean="0"/>
                   <a:t>Decelerator Axis (mm</a:t>
                 </a:r>
                 <a:r>
@@ -9518,8 +9518,8 @@
         </p:nvSpPr>
         <p:spPr>
           <a:xfrm rot="16200000">
-            <a:off x="11563409" y="1120606"/>
-            <a:ext cx="2085239" cy="323165"/>
+            <a:off x="11386896" y="1297119"/>
+            <a:ext cx="2438266" cy="323165"/>
           </a:xfrm>
           <a:prstGeom prst="rect">
             <a:avLst/>
@@ -9534,7 +9534,35 @@
           <a:p>
             <a:r>
               <a:rPr lang="en-US" sz="1500" dirty="0"/>
-              <a:t>E-Field Norm (kV/cm)</a:t>
+              <a:t>E-Field </a:t>
+            </a:r>
+            <a:r>
+              <a:rPr lang="en-US" sz="1500" dirty="0" smtClean="0"/>
+              <a:t>Norm </a:t>
+            </a:r>
+            <a:r>
+              <a:rPr lang="en-US" sz="1500" dirty="0"/>
+              <a:t>|</a:t>
+            </a:r>
+            <a:r>
+              <a:rPr lang="en-US" sz="1500" i="1" dirty="0">
+                <a:latin typeface="Times New Roman" charset="0"/>
+                <a:ea typeface="Times New Roman" charset="0"/>
+                <a:cs typeface="Times New Roman" charset="0"/>
+              </a:rPr>
+              <a:t>E</a:t>
+            </a:r>
+            <a:r>
+              <a:rPr lang="en-US" sz="1500" dirty="0"/>
+              <a:t>|</a:t>
+            </a:r>
+            <a:r>
+              <a:rPr lang="en-US" sz="1500" dirty="0" smtClean="0"/>
+              <a:t> </a:t>
+            </a:r>
+            <a:r>
+              <a:rPr lang="en-US" sz="1500" dirty="0"/>
+              <a:t>(kV/cm)</a:t>
             </a:r>
           </a:p>
         </p:txBody>
@@ -13731,8 +13759,8 @@
         </p:nvSpPr>
         <p:spPr>
           <a:xfrm>
-            <a:off x="9387219" y="1554472"/>
-            <a:ext cx="1787703" cy="323165"/>
+            <a:off x="9006840" y="1605271"/>
+            <a:ext cx="2082183" cy="323165"/>
           </a:xfrm>
           <a:prstGeom prst="rect">
             <a:avLst/>
@@ -13746,8 +13774,12 @@
           <a:lstStyle/>
           <a:p>
             <a:r>
+              <a:rPr lang="en-US" sz="1500" dirty="0" smtClean="0"/>
+              <a:t>Decelerator Axis (mm</a:t>
+            </a:r>
+            <a:r>
               <a:rPr lang="en-US" sz="1500" dirty="0"/>
-              <a:t>Distance (mm)</a:t>
+              <a:t>)</a:t>
             </a:r>
           </a:p>
         </p:txBody>

</xml_diff>